<commit_message>
Deployed 3b881ef with MkDocs version: 1.2.2
</commit_message>
<xml_diff>
--- a/img/EV3.pptx
+++ b/img/EV3.pptx
@@ -5,7 +5,7 @@
     <p:sldMasterId id="2147483648" r:id="rId1"/>
   </p:sldMasterIdLst>
   <p:notesMasterIdLst>
-    <p:notesMasterId r:id="rId8"/>
+    <p:notesMasterId r:id="rId12"/>
   </p:notesMasterIdLst>
   <p:sldIdLst>
     <p:sldId id="256" r:id="rId2"/>
@@ -14,6 +14,10 @@
     <p:sldId id="258" r:id="rId5"/>
     <p:sldId id="259" r:id="rId6"/>
     <p:sldId id="260" r:id="rId7"/>
+    <p:sldId id="262" r:id="rId8"/>
+    <p:sldId id="263" r:id="rId9"/>
+    <p:sldId id="265" r:id="rId10"/>
+    <p:sldId id="264" r:id="rId11"/>
   </p:sldIdLst>
   <p:sldSz cx="6858000" cy="9906000" type="A4"/>
   <p:notesSz cx="6858000" cy="9144000"/>
@@ -213,7 +217,7 @@
           <a:p>
             <a:fld id="{3CAF0AF7-3F55-4B24-B16B-6CC0FFAB2CD8}" type="datetimeFigureOut">
               <a:rPr kumimoji="1" lang="ja-JP" altLang="en-US" smtClean="0"/>
-              <a:t>2021/9/3</a:t>
+              <a:t>2021/9/14</a:t>
             </a:fld>
             <a:endParaRPr kumimoji="1" lang="ja-JP" altLang="en-US"/>
           </a:p>
@@ -995,7 +999,7 @@
           <a:p>
             <a:fld id="{B6E4E19A-16B6-40DD-A056-28517AEA3095}" type="datetimeFigureOut">
               <a:rPr kumimoji="1" lang="ja-JP" altLang="en-US" smtClean="0"/>
-              <a:t>2021/9/3</a:t>
+              <a:t>2021/9/14</a:t>
             </a:fld>
             <a:endParaRPr kumimoji="1" lang="ja-JP" altLang="en-US"/>
           </a:p>
@@ -1225,7 +1229,7 @@
           <a:p>
             <a:fld id="{B6E4E19A-16B6-40DD-A056-28517AEA3095}" type="datetimeFigureOut">
               <a:rPr kumimoji="1" lang="ja-JP" altLang="en-US" smtClean="0"/>
-              <a:t>2021/9/3</a:t>
+              <a:t>2021/9/14</a:t>
             </a:fld>
             <a:endParaRPr kumimoji="1" lang="ja-JP" altLang="en-US"/>
           </a:p>
@@ -1465,7 +1469,7 @@
           <a:p>
             <a:fld id="{B6E4E19A-16B6-40DD-A056-28517AEA3095}" type="datetimeFigureOut">
               <a:rPr kumimoji="1" lang="ja-JP" altLang="en-US" smtClean="0"/>
-              <a:t>2021/9/3</a:t>
+              <a:t>2021/9/14</a:t>
             </a:fld>
             <a:endParaRPr kumimoji="1" lang="ja-JP" altLang="en-US"/>
           </a:p>
@@ -1695,7 +1699,7 @@
           <a:p>
             <a:fld id="{B6E4E19A-16B6-40DD-A056-28517AEA3095}" type="datetimeFigureOut">
               <a:rPr kumimoji="1" lang="ja-JP" altLang="en-US" smtClean="0"/>
-              <a:t>2021/9/3</a:t>
+              <a:t>2021/9/14</a:t>
             </a:fld>
             <a:endParaRPr kumimoji="1" lang="ja-JP" altLang="en-US"/>
           </a:p>
@@ -1970,7 +1974,7 @@
           <a:p>
             <a:fld id="{B6E4E19A-16B6-40DD-A056-28517AEA3095}" type="datetimeFigureOut">
               <a:rPr kumimoji="1" lang="ja-JP" altLang="en-US" smtClean="0"/>
-              <a:t>2021/9/3</a:t>
+              <a:t>2021/9/14</a:t>
             </a:fld>
             <a:endParaRPr kumimoji="1" lang="ja-JP" altLang="en-US"/>
           </a:p>
@@ -2299,7 +2303,7 @@
           <a:p>
             <a:fld id="{B6E4E19A-16B6-40DD-A056-28517AEA3095}" type="datetimeFigureOut">
               <a:rPr kumimoji="1" lang="ja-JP" altLang="en-US" smtClean="0"/>
-              <a:t>2021/9/3</a:t>
+              <a:t>2021/9/14</a:t>
             </a:fld>
             <a:endParaRPr kumimoji="1" lang="ja-JP" altLang="en-US"/>
           </a:p>
@@ -2775,7 +2779,7 @@
           <a:p>
             <a:fld id="{B6E4E19A-16B6-40DD-A056-28517AEA3095}" type="datetimeFigureOut">
               <a:rPr kumimoji="1" lang="ja-JP" altLang="en-US" smtClean="0"/>
-              <a:t>2021/9/3</a:t>
+              <a:t>2021/9/14</a:t>
             </a:fld>
             <a:endParaRPr kumimoji="1" lang="ja-JP" altLang="en-US"/>
           </a:p>
@@ -2916,7 +2920,7 @@
           <a:p>
             <a:fld id="{B6E4E19A-16B6-40DD-A056-28517AEA3095}" type="datetimeFigureOut">
               <a:rPr kumimoji="1" lang="ja-JP" altLang="en-US" smtClean="0"/>
-              <a:t>2021/9/3</a:t>
+              <a:t>2021/9/14</a:t>
             </a:fld>
             <a:endParaRPr kumimoji="1" lang="ja-JP" altLang="en-US"/>
           </a:p>
@@ -3029,7 +3033,7 @@
           <a:p>
             <a:fld id="{B6E4E19A-16B6-40DD-A056-28517AEA3095}" type="datetimeFigureOut">
               <a:rPr kumimoji="1" lang="ja-JP" altLang="en-US" smtClean="0"/>
-              <a:t>2021/9/3</a:t>
+              <a:t>2021/9/14</a:t>
             </a:fld>
             <a:endParaRPr kumimoji="1" lang="ja-JP" altLang="en-US"/>
           </a:p>
@@ -3372,7 +3376,7 @@
           <a:p>
             <a:fld id="{B6E4E19A-16B6-40DD-A056-28517AEA3095}" type="datetimeFigureOut">
               <a:rPr kumimoji="1" lang="ja-JP" altLang="en-US" smtClean="0"/>
-              <a:t>2021/9/3</a:t>
+              <a:t>2021/9/14</a:t>
             </a:fld>
             <a:endParaRPr kumimoji="1" lang="ja-JP" altLang="en-US"/>
           </a:p>
@@ -3660,7 +3664,7 @@
           <a:p>
             <a:fld id="{B6E4E19A-16B6-40DD-A056-28517AEA3095}" type="datetimeFigureOut">
               <a:rPr kumimoji="1" lang="ja-JP" altLang="en-US" smtClean="0"/>
-              <a:t>2021/9/3</a:t>
+              <a:t>2021/9/14</a:t>
             </a:fld>
             <a:endParaRPr kumimoji="1" lang="ja-JP" altLang="en-US"/>
           </a:p>
@@ -3933,7 +3937,7 @@
           <a:p>
             <a:fld id="{B6E4E19A-16B6-40DD-A056-28517AEA3095}" type="datetimeFigureOut">
               <a:rPr kumimoji="1" lang="ja-JP" altLang="en-US" smtClean="0"/>
-              <a:t>2021/9/3</a:t>
+              <a:t>2021/9/14</a:t>
             </a:fld>
             <a:endParaRPr kumimoji="1" lang="ja-JP" altLang="en-US"/>
           </a:p>
@@ -4423,6 +4427,138 @@
 </p:sld>
 </file>
 
+<file path=ppt/slides/slide10.xml><?xml version="1.0" encoding="utf-8"?>
+<p:sld xmlns:a="http://schemas.openxmlformats.org/drawingml/2006/main" xmlns:r="http://schemas.openxmlformats.org/officeDocument/2006/relationships" xmlns:p="http://schemas.openxmlformats.org/presentationml/2006/main">
+  <p:cSld>
+    <p:spTree>
+      <p:nvGrpSpPr>
+        <p:cNvPr id="1" name=""/>
+        <p:cNvGrpSpPr/>
+        <p:nvPr/>
+      </p:nvGrpSpPr>
+      <p:grpSpPr>
+        <a:xfrm>
+          <a:off x="0" y="0"/>
+          <a:ext cx="0" cy="0"/>
+          <a:chOff x="0" y="0"/>
+          <a:chExt cx="0" cy="0"/>
+        </a:xfrm>
+      </p:grpSpPr>
+      <p:pic>
+        <p:nvPicPr>
+          <p:cNvPr id="4" name="図 3">
+            <a:extLst>
+              <a:ext uri="{FF2B5EF4-FFF2-40B4-BE49-F238E27FC236}">
+                <a16:creationId xmlns:a16="http://schemas.microsoft.com/office/drawing/2014/main" id="{0BDBDDB0-69FC-4CB0-B3E4-907B28BE4A76}"/>
+              </a:ext>
+            </a:extLst>
+          </p:cNvPr>
+          <p:cNvPicPr>
+            <a:picLocks noChangeAspect="1"/>
+          </p:cNvPicPr>
+          <p:nvPr/>
+        </p:nvPicPr>
+        <p:blipFill rotWithShape="1">
+          <a:blip r:embed="rId2"/>
+          <a:srcRect r="19192" b="66065"/>
+          <a:stretch/>
+        </p:blipFill>
+        <p:spPr>
+          <a:xfrm>
+            <a:off x="0" y="0"/>
+            <a:ext cx="6858000" cy="2160000"/>
+          </a:xfrm>
+          <a:prstGeom prst="rect">
+            <a:avLst/>
+          </a:prstGeom>
+        </p:spPr>
+      </p:pic>
+      <p:pic>
+        <p:nvPicPr>
+          <p:cNvPr id="5" name="図 4">
+            <a:extLst>
+              <a:ext uri="{FF2B5EF4-FFF2-40B4-BE49-F238E27FC236}">
+                <a16:creationId xmlns:a16="http://schemas.microsoft.com/office/drawing/2014/main" id="{B4321FF2-93E9-4741-AF3B-5F8EC1DAF0C3}"/>
+              </a:ext>
+            </a:extLst>
+          </p:cNvPr>
+          <p:cNvPicPr>
+            <a:picLocks noChangeAspect="1"/>
+          </p:cNvPicPr>
+          <p:nvPr/>
+        </p:nvPicPr>
+        <p:blipFill>
+          <a:blip r:embed="rId3"/>
+          <a:stretch>
+            <a:fillRect/>
+          </a:stretch>
+        </p:blipFill>
+        <p:spPr>
+          <a:xfrm>
+            <a:off x="0" y="2443843"/>
+            <a:ext cx="6858000" cy="5143500"/>
+          </a:xfrm>
+          <a:prstGeom prst="rect">
+            <a:avLst/>
+          </a:prstGeom>
+        </p:spPr>
+      </p:pic>
+      <p:cxnSp>
+        <p:nvCxnSpPr>
+          <p:cNvPr id="6" name="直線コネクタ 5">
+            <a:extLst>
+              <a:ext uri="{FF2B5EF4-FFF2-40B4-BE49-F238E27FC236}">
+                <a16:creationId xmlns:a16="http://schemas.microsoft.com/office/drawing/2014/main" id="{BCC292EC-7DFC-435F-A203-F9F3AD12884D}"/>
+              </a:ext>
+            </a:extLst>
+          </p:cNvPr>
+          <p:cNvCxnSpPr>
+            <a:cxnSpLocks/>
+          </p:cNvCxnSpPr>
+          <p:nvPr/>
+        </p:nvCxnSpPr>
+        <p:spPr>
+          <a:xfrm>
+            <a:off x="1828801" y="743831"/>
+            <a:ext cx="1600199" cy="0"/>
+          </a:xfrm>
+          <a:prstGeom prst="line">
+            <a:avLst/>
+          </a:prstGeom>
+          <a:ln w="38100">
+            <a:solidFill>
+              <a:srgbClr val="FF0000"/>
+            </a:solidFill>
+          </a:ln>
+        </p:spPr>
+        <p:style>
+          <a:lnRef idx="1">
+            <a:schemeClr val="accent1"/>
+          </a:lnRef>
+          <a:fillRef idx="0">
+            <a:schemeClr val="accent1"/>
+          </a:fillRef>
+          <a:effectRef idx="0">
+            <a:schemeClr val="accent1"/>
+          </a:effectRef>
+          <a:fontRef idx="minor">
+            <a:schemeClr val="tx1"/>
+          </a:fontRef>
+        </p:style>
+      </p:cxnSp>
+    </p:spTree>
+    <p:extLst>
+      <p:ext uri="{BB962C8B-B14F-4D97-AF65-F5344CB8AC3E}">
+        <p14:creationId xmlns:p14="http://schemas.microsoft.com/office/powerpoint/2010/main" val="1434286085"/>
+      </p:ext>
+    </p:extLst>
+  </p:cSld>
+  <p:clrMapOvr>
+    <a:masterClrMapping/>
+  </p:clrMapOvr>
+</p:sld>
+</file>
+
 <file path=ppt/slides/slide2.xml><?xml version="1.0" encoding="utf-8"?>
 <p:sld xmlns:a="http://schemas.openxmlformats.org/drawingml/2006/main" xmlns:r="http://schemas.openxmlformats.org/officeDocument/2006/relationships" xmlns:p="http://schemas.openxmlformats.org/presentationml/2006/main">
   <p:cSld>
@@ -5909,6 +6045,470 @@
     <p:extLst>
       <p:ext uri="{BB962C8B-B14F-4D97-AF65-F5344CB8AC3E}">
         <p14:creationId xmlns:p14="http://schemas.microsoft.com/office/powerpoint/2010/main" val="4083545621"/>
+      </p:ext>
+    </p:extLst>
+  </p:cSld>
+  <p:clrMapOvr>
+    <a:masterClrMapping/>
+  </p:clrMapOvr>
+</p:sld>
+</file>
+
+<file path=ppt/slides/slide7.xml><?xml version="1.0" encoding="utf-8"?>
+<p:sld xmlns:a="http://schemas.openxmlformats.org/drawingml/2006/main" xmlns:r="http://schemas.openxmlformats.org/officeDocument/2006/relationships" xmlns:p="http://schemas.openxmlformats.org/presentationml/2006/main">
+  <p:cSld>
+    <p:spTree>
+      <p:nvGrpSpPr>
+        <p:cNvPr id="1" name=""/>
+        <p:cNvGrpSpPr/>
+        <p:nvPr/>
+      </p:nvGrpSpPr>
+      <p:grpSpPr>
+        <a:xfrm>
+          <a:off x="0" y="0"/>
+          <a:ext cx="0" cy="0"/>
+          <a:chOff x="0" y="0"/>
+          <a:chExt cx="0" cy="0"/>
+        </a:xfrm>
+      </p:grpSpPr>
+      <p:pic>
+        <p:nvPicPr>
+          <p:cNvPr id="3" name="図 2">
+            <a:extLst>
+              <a:ext uri="{FF2B5EF4-FFF2-40B4-BE49-F238E27FC236}">
+                <a16:creationId xmlns:a16="http://schemas.microsoft.com/office/drawing/2014/main" id="{30900560-CDA2-4D1C-9932-D3D37D808E0E}"/>
+              </a:ext>
+            </a:extLst>
+          </p:cNvPr>
+          <p:cNvPicPr>
+            <a:picLocks noChangeAspect="1"/>
+          </p:cNvPicPr>
+          <p:nvPr/>
+        </p:nvPicPr>
+        <p:blipFill rotWithShape="1">
+          <a:blip r:embed="rId2"/>
+          <a:srcRect r="19192" b="46269"/>
+          <a:stretch/>
+        </p:blipFill>
+        <p:spPr>
+          <a:xfrm>
+            <a:off x="0" y="0"/>
+            <a:ext cx="6858000" cy="3420000"/>
+          </a:xfrm>
+          <a:prstGeom prst="rect">
+            <a:avLst/>
+          </a:prstGeom>
+        </p:spPr>
+      </p:pic>
+      <p:sp>
+        <p:nvSpPr>
+          <p:cNvPr id="4" name="楕円 3">
+            <a:extLst>
+              <a:ext uri="{FF2B5EF4-FFF2-40B4-BE49-F238E27FC236}">
+                <a16:creationId xmlns:a16="http://schemas.microsoft.com/office/drawing/2014/main" id="{7A821713-CCFD-4DC8-8328-80468C1A6013}"/>
+              </a:ext>
+            </a:extLst>
+          </p:cNvPr>
+          <p:cNvSpPr/>
+          <p:nvPr/>
+        </p:nvSpPr>
+        <p:spPr>
+          <a:xfrm>
+            <a:off x="52254" y="1520456"/>
+            <a:ext cx="296091" cy="296091"/>
+          </a:xfrm>
+          <a:prstGeom prst="ellipse">
+            <a:avLst/>
+          </a:prstGeom>
+          <a:noFill/>
+          <a:ln w="38100">
+            <a:solidFill>
+              <a:srgbClr val="FF0000"/>
+            </a:solidFill>
+          </a:ln>
+        </p:spPr>
+        <p:style>
+          <a:lnRef idx="2">
+            <a:schemeClr val="accent1">
+              <a:shade val="50000"/>
+            </a:schemeClr>
+          </a:lnRef>
+          <a:fillRef idx="1">
+            <a:schemeClr val="accent1"/>
+          </a:fillRef>
+          <a:effectRef idx="0">
+            <a:schemeClr val="accent1"/>
+          </a:effectRef>
+          <a:fontRef idx="minor">
+            <a:schemeClr val="lt1"/>
+          </a:fontRef>
+        </p:style>
+        <p:txBody>
+          <a:bodyPr rtlCol="0" anchor="ctr"/>
+          <a:lstStyle/>
+          <a:p>
+            <a:pPr algn="ctr"/>
+            <a:endParaRPr kumimoji="1" lang="ja-JP" altLang="en-US" dirty="0"/>
+          </a:p>
+        </p:txBody>
+      </p:sp>
+      <p:sp>
+        <p:nvSpPr>
+          <p:cNvPr id="5" name="楕円 4">
+            <a:extLst>
+              <a:ext uri="{FF2B5EF4-FFF2-40B4-BE49-F238E27FC236}">
+                <a16:creationId xmlns:a16="http://schemas.microsoft.com/office/drawing/2014/main" id="{755934AE-2BEF-4202-A59B-5460948930A0}"/>
+              </a:ext>
+            </a:extLst>
+          </p:cNvPr>
+          <p:cNvSpPr/>
+          <p:nvPr/>
+        </p:nvSpPr>
+        <p:spPr>
+          <a:xfrm>
+            <a:off x="852354" y="263156"/>
+            <a:ext cx="296091" cy="296091"/>
+          </a:xfrm>
+          <a:prstGeom prst="ellipse">
+            <a:avLst/>
+          </a:prstGeom>
+          <a:noFill/>
+          <a:ln w="38100">
+            <a:solidFill>
+              <a:srgbClr val="FF0000"/>
+            </a:solidFill>
+          </a:ln>
+        </p:spPr>
+        <p:style>
+          <a:lnRef idx="2">
+            <a:schemeClr val="accent1">
+              <a:shade val="50000"/>
+            </a:schemeClr>
+          </a:lnRef>
+          <a:fillRef idx="1">
+            <a:schemeClr val="accent1"/>
+          </a:fillRef>
+          <a:effectRef idx="0">
+            <a:schemeClr val="accent1"/>
+          </a:effectRef>
+          <a:fontRef idx="minor">
+            <a:schemeClr val="lt1"/>
+          </a:fontRef>
+        </p:style>
+        <p:txBody>
+          <a:bodyPr rtlCol="0" anchor="ctr"/>
+          <a:lstStyle/>
+          <a:p>
+            <a:pPr algn="ctr"/>
+            <a:endParaRPr kumimoji="1" lang="ja-JP" altLang="en-US" dirty="0"/>
+          </a:p>
+        </p:txBody>
+      </p:sp>
+      <p:pic>
+        <p:nvPicPr>
+          <p:cNvPr id="6" name="図 5">
+            <a:extLst>
+              <a:ext uri="{FF2B5EF4-FFF2-40B4-BE49-F238E27FC236}">
+                <a16:creationId xmlns:a16="http://schemas.microsoft.com/office/drawing/2014/main" id="{5DF5F62B-AA4C-4429-B574-C795BB31DC93}"/>
+              </a:ext>
+            </a:extLst>
+          </p:cNvPr>
+          <p:cNvPicPr>
+            <a:picLocks noChangeAspect="1"/>
+          </p:cNvPicPr>
+          <p:nvPr/>
+        </p:nvPicPr>
+        <p:blipFill rotWithShape="1">
+          <a:blip r:embed="rId3"/>
+          <a:srcRect t="74623" r="19181" b="-74"/>
+          <a:stretch/>
+        </p:blipFill>
+        <p:spPr>
+          <a:xfrm>
+            <a:off x="0" y="3761212"/>
+            <a:ext cx="6858000" cy="1620000"/>
+          </a:xfrm>
+          <a:prstGeom prst="rect">
+            <a:avLst/>
+          </a:prstGeom>
+        </p:spPr>
+      </p:pic>
+      <p:pic>
+        <p:nvPicPr>
+          <p:cNvPr id="7" name="図 6">
+            <a:extLst>
+              <a:ext uri="{FF2B5EF4-FFF2-40B4-BE49-F238E27FC236}">
+                <a16:creationId xmlns:a16="http://schemas.microsoft.com/office/drawing/2014/main" id="{596DD732-35CC-4651-A6C0-BEC60594EEAF}"/>
+              </a:ext>
+            </a:extLst>
+          </p:cNvPr>
+          <p:cNvPicPr>
+            <a:picLocks noChangeAspect="1"/>
+          </p:cNvPicPr>
+          <p:nvPr/>
+        </p:nvPicPr>
+        <p:blipFill rotWithShape="1">
+          <a:blip r:embed="rId4"/>
+          <a:srcRect t="74546" r="19181"/>
+          <a:stretch/>
+        </p:blipFill>
+        <p:spPr>
+          <a:xfrm>
+            <a:off x="0" y="5722424"/>
+            <a:ext cx="6858000" cy="1619999"/>
+          </a:xfrm>
+          <a:prstGeom prst="rect">
+            <a:avLst/>
+          </a:prstGeom>
+        </p:spPr>
+      </p:pic>
+      <p:sp>
+        <p:nvSpPr>
+          <p:cNvPr id="8" name="楕円 7">
+            <a:extLst>
+              <a:ext uri="{FF2B5EF4-FFF2-40B4-BE49-F238E27FC236}">
+                <a16:creationId xmlns:a16="http://schemas.microsoft.com/office/drawing/2014/main" id="{5696142C-83AE-4812-A963-6E299A4A52D7}"/>
+              </a:ext>
+            </a:extLst>
+          </p:cNvPr>
+          <p:cNvSpPr/>
+          <p:nvPr/>
+        </p:nvSpPr>
+        <p:spPr>
+          <a:xfrm>
+            <a:off x="2256738" y="5947144"/>
+            <a:ext cx="296091" cy="296091"/>
+          </a:xfrm>
+          <a:prstGeom prst="ellipse">
+            <a:avLst/>
+          </a:prstGeom>
+          <a:noFill/>
+          <a:ln w="38100">
+            <a:solidFill>
+              <a:srgbClr val="FF0000"/>
+            </a:solidFill>
+          </a:ln>
+        </p:spPr>
+        <p:style>
+          <a:lnRef idx="2">
+            <a:schemeClr val="accent1">
+              <a:shade val="50000"/>
+            </a:schemeClr>
+          </a:lnRef>
+          <a:fillRef idx="1">
+            <a:schemeClr val="accent1"/>
+          </a:fillRef>
+          <a:effectRef idx="0">
+            <a:schemeClr val="accent1"/>
+          </a:effectRef>
+          <a:fontRef idx="minor">
+            <a:schemeClr val="lt1"/>
+          </a:fontRef>
+        </p:style>
+        <p:txBody>
+          <a:bodyPr rtlCol="0" anchor="ctr"/>
+          <a:lstStyle/>
+          <a:p>
+            <a:pPr algn="ctr"/>
+            <a:endParaRPr kumimoji="1" lang="ja-JP" altLang="en-US" dirty="0"/>
+          </a:p>
+        </p:txBody>
+      </p:sp>
+    </p:spTree>
+    <p:extLst>
+      <p:ext uri="{BB962C8B-B14F-4D97-AF65-F5344CB8AC3E}">
+        <p14:creationId xmlns:p14="http://schemas.microsoft.com/office/powerpoint/2010/main" val="2648470430"/>
+      </p:ext>
+    </p:extLst>
+  </p:cSld>
+  <p:clrMapOvr>
+    <a:masterClrMapping/>
+  </p:clrMapOvr>
+</p:sld>
+</file>
+
+<file path=ppt/slides/slide8.xml><?xml version="1.0" encoding="utf-8"?>
+<p:sld xmlns:a="http://schemas.openxmlformats.org/drawingml/2006/main" xmlns:r="http://schemas.openxmlformats.org/officeDocument/2006/relationships" xmlns:p="http://schemas.openxmlformats.org/presentationml/2006/main">
+  <p:cSld>
+    <p:spTree>
+      <p:nvGrpSpPr>
+        <p:cNvPr id="1" name=""/>
+        <p:cNvGrpSpPr/>
+        <p:nvPr/>
+      </p:nvGrpSpPr>
+      <p:grpSpPr>
+        <a:xfrm>
+          <a:off x="0" y="0"/>
+          <a:ext cx="0" cy="0"/>
+          <a:chOff x="0" y="0"/>
+          <a:chExt cx="0" cy="0"/>
+        </a:xfrm>
+      </p:grpSpPr>
+      <p:pic>
+        <p:nvPicPr>
+          <p:cNvPr id="2" name="図 1">
+            <a:extLst>
+              <a:ext uri="{FF2B5EF4-FFF2-40B4-BE49-F238E27FC236}">
+                <a16:creationId xmlns:a16="http://schemas.microsoft.com/office/drawing/2014/main" id="{88737BD2-8A38-4B1B-A40F-741CEE4DD536}"/>
+              </a:ext>
+            </a:extLst>
+          </p:cNvPr>
+          <p:cNvPicPr>
+            <a:picLocks noChangeAspect="1"/>
+          </p:cNvPicPr>
+          <p:nvPr/>
+        </p:nvPicPr>
+        <p:blipFill rotWithShape="1">
+          <a:blip r:embed="rId2"/>
+          <a:srcRect t="74545" r="19181"/>
+          <a:stretch/>
+        </p:blipFill>
+        <p:spPr>
+          <a:xfrm>
+            <a:off x="0" y="0"/>
+            <a:ext cx="6858000" cy="1619999"/>
+          </a:xfrm>
+          <a:prstGeom prst="rect">
+            <a:avLst/>
+          </a:prstGeom>
+        </p:spPr>
+      </p:pic>
+      <p:cxnSp>
+        <p:nvCxnSpPr>
+          <p:cNvPr id="4" name="直線コネクタ 3">
+            <a:extLst>
+              <a:ext uri="{FF2B5EF4-FFF2-40B4-BE49-F238E27FC236}">
+                <a16:creationId xmlns:a16="http://schemas.microsoft.com/office/drawing/2014/main" id="{950675CE-7457-42F8-A8DB-D30632173380}"/>
+              </a:ext>
+            </a:extLst>
+          </p:cNvPr>
+          <p:cNvCxnSpPr>
+            <a:cxnSpLocks/>
+          </p:cNvCxnSpPr>
+          <p:nvPr/>
+        </p:nvCxnSpPr>
+        <p:spPr>
+          <a:xfrm>
+            <a:off x="839669" y="1360764"/>
+            <a:ext cx="489401" cy="0"/>
+          </a:xfrm>
+          <a:prstGeom prst="line">
+            <a:avLst/>
+          </a:prstGeom>
+          <a:ln w="38100">
+            <a:solidFill>
+              <a:srgbClr val="FF0000"/>
+            </a:solidFill>
+          </a:ln>
+        </p:spPr>
+        <p:style>
+          <a:lnRef idx="1">
+            <a:schemeClr val="accent1"/>
+          </a:lnRef>
+          <a:fillRef idx="0">
+            <a:schemeClr val="accent1"/>
+          </a:fillRef>
+          <a:effectRef idx="0">
+            <a:schemeClr val="accent1"/>
+          </a:effectRef>
+          <a:fontRef idx="minor">
+            <a:schemeClr val="tx1"/>
+          </a:fontRef>
+        </p:style>
+      </p:cxnSp>
+    </p:spTree>
+    <p:extLst>
+      <p:ext uri="{BB962C8B-B14F-4D97-AF65-F5344CB8AC3E}">
+        <p14:creationId xmlns:p14="http://schemas.microsoft.com/office/powerpoint/2010/main" val="1290526422"/>
+      </p:ext>
+    </p:extLst>
+  </p:cSld>
+  <p:clrMapOvr>
+    <a:masterClrMapping/>
+  </p:clrMapOvr>
+</p:sld>
+</file>
+
+<file path=ppt/slides/slide9.xml><?xml version="1.0" encoding="utf-8"?>
+<p:sld xmlns:a="http://schemas.openxmlformats.org/drawingml/2006/main" xmlns:r="http://schemas.openxmlformats.org/officeDocument/2006/relationships" xmlns:p="http://schemas.openxmlformats.org/presentationml/2006/main">
+  <p:cSld>
+    <p:spTree>
+      <p:nvGrpSpPr>
+        <p:cNvPr id="1" name=""/>
+        <p:cNvGrpSpPr/>
+        <p:nvPr/>
+      </p:nvGrpSpPr>
+      <p:grpSpPr>
+        <a:xfrm>
+          <a:off x="0" y="0"/>
+          <a:ext cx="0" cy="0"/>
+          <a:chOff x="0" y="0"/>
+          <a:chExt cx="0" cy="0"/>
+        </a:xfrm>
+      </p:grpSpPr>
+      <p:pic>
+        <p:nvPicPr>
+          <p:cNvPr id="15" name="図 14">
+            <a:extLst>
+              <a:ext uri="{FF2B5EF4-FFF2-40B4-BE49-F238E27FC236}">
+                <a16:creationId xmlns:a16="http://schemas.microsoft.com/office/drawing/2014/main" id="{B093DDD8-B660-4693-94F9-EF4A9121ED54}"/>
+              </a:ext>
+            </a:extLst>
+          </p:cNvPr>
+          <p:cNvPicPr>
+            <a:picLocks noChangeAspect="1"/>
+          </p:cNvPicPr>
+          <p:nvPr/>
+        </p:nvPicPr>
+        <p:blipFill rotWithShape="1">
+          <a:blip r:embed="rId2"/>
+          <a:srcRect l="4097" t="36945" r="4256" b="7163"/>
+          <a:stretch/>
+        </p:blipFill>
+        <p:spPr>
+          <a:xfrm>
+            <a:off x="118981" y="1034926"/>
+            <a:ext cx="3457303" cy="1027611"/>
+          </a:xfrm>
+          <a:prstGeom prst="rect">
+            <a:avLst/>
+          </a:prstGeom>
+        </p:spPr>
+      </p:pic>
+      <p:pic>
+        <p:nvPicPr>
+          <p:cNvPr id="16" name="図 15">
+            <a:extLst>
+              <a:ext uri="{FF2B5EF4-FFF2-40B4-BE49-F238E27FC236}">
+                <a16:creationId xmlns:a16="http://schemas.microsoft.com/office/drawing/2014/main" id="{C1050E97-89C2-4969-9255-CA789FAAFA16}"/>
+              </a:ext>
+            </a:extLst>
+          </p:cNvPr>
+          <p:cNvPicPr>
+            <a:picLocks noChangeAspect="1"/>
+          </p:cNvPicPr>
+          <p:nvPr/>
+        </p:nvPicPr>
+        <p:blipFill>
+          <a:blip r:embed="rId3"/>
+          <a:stretch>
+            <a:fillRect/>
+          </a:stretch>
+        </p:blipFill>
+        <p:spPr>
+          <a:xfrm>
+            <a:off x="101051" y="2272366"/>
+            <a:ext cx="5239481" cy="2381582"/>
+          </a:xfrm>
+          <a:prstGeom prst="rect">
+            <a:avLst/>
+          </a:prstGeom>
+        </p:spPr>
+      </p:pic>
+    </p:spTree>
+    <p:extLst>
+      <p:ext uri="{BB962C8B-B14F-4D97-AF65-F5344CB8AC3E}">
+        <p14:creationId xmlns:p14="http://schemas.microsoft.com/office/powerpoint/2010/main" val="3404477533"/>
       </p:ext>
     </p:extLst>
   </p:cSld>

</xml_diff>